<commit_message>
new jobs and cleaning up old ones.
</commit_message>
<xml_diff>
--- a/teste-design.gerado.updated.pptx
+++ b/teste-design.gerado.updated.pptx
@@ -6,6 +6,7 @@
   </p:sldMasterIdLst>
   <p:sldIdLst>
     <p:sldId id="256" r:id="rId2"/>
+    <p:sldId id="257" r:id="rId3"/>
   </p:sldIdLst>
   <p:sldSz cx="12192000" cy="6858000"/>
   <p:notesSz cx="6858000" cy="9144000"/>
@@ -447,7 +448,7 @@
           <a:p>
             <a:fld id="{0FFCB9F6-63FC-4ED5-A42C-D418A1CF0414}" type="datetimeFigureOut">
               <a:rPr lang="pt-BR" smtClean="0"/>
-              <a:t>04/01/2026</a:t>
+              <a:t>08/01/2026</a:t>
             </a:fld>
             <a:endParaRPr lang="pt-BR"/>
           </a:p>
@@ -1535,7 +1536,7 @@
           <a:p>
             <a:fld id="{0FFCB9F6-63FC-4ED5-A42C-D418A1CF0414}" type="datetimeFigureOut">
               <a:rPr lang="pt-BR" smtClean="0"/>
-              <a:t>04/01/2026</a:t>
+              <a:t>08/01/2026</a:t>
             </a:fld>
             <a:endParaRPr lang="pt-BR"/>
           </a:p>
@@ -2515,7 +2516,7 @@
           <a:p>
             <a:fld id="{0FFCB9F6-63FC-4ED5-A42C-D418A1CF0414}" type="datetimeFigureOut">
               <a:rPr lang="pt-BR" smtClean="0"/>
-              <a:t>04/01/2026</a:t>
+              <a:t>08/01/2026</a:t>
             </a:fld>
             <a:endParaRPr lang="pt-BR"/>
           </a:p>
@@ -3649,7 +3650,7 @@
           <a:p>
             <a:fld id="{0FFCB9F6-63FC-4ED5-A42C-D418A1CF0414}" type="datetimeFigureOut">
               <a:rPr lang="pt-BR" smtClean="0"/>
-              <a:t>04/01/2026</a:t>
+              <a:t>08/01/2026</a:t>
             </a:fld>
             <a:endParaRPr lang="pt-BR"/>
           </a:p>
@@ -4682,7 +4683,7 @@
           <a:p>
             <a:fld id="{0FFCB9F6-63FC-4ED5-A42C-D418A1CF0414}" type="datetimeFigureOut">
               <a:rPr lang="pt-BR" smtClean="0"/>
-              <a:t>04/01/2026</a:t>
+              <a:t>08/01/2026</a:t>
             </a:fld>
             <a:endParaRPr lang="pt-BR"/>
           </a:p>
@@ -5342,7 +5343,7 @@
           <a:p>
             <a:fld id="{0FFCB9F6-63FC-4ED5-A42C-D418A1CF0414}" type="datetimeFigureOut">
               <a:rPr lang="pt-BR" smtClean="0"/>
-              <a:t>04/01/2026</a:t>
+              <a:t>08/01/2026</a:t>
             </a:fld>
             <a:endParaRPr lang="pt-BR"/>
           </a:p>
@@ -6203,7 +6204,7 @@
           <a:p>
             <a:fld id="{0FFCB9F6-63FC-4ED5-A42C-D418A1CF0414}" type="datetimeFigureOut">
               <a:rPr lang="pt-BR" smtClean="0"/>
-              <a:t>04/01/2026</a:t>
+              <a:t>08/01/2026</a:t>
             </a:fld>
             <a:endParaRPr lang="pt-BR"/>
           </a:p>
@@ -6393,7 +6394,7 @@
           <a:p>
             <a:fld id="{0FFCB9F6-63FC-4ED5-A42C-D418A1CF0414}" type="datetimeFigureOut">
               <a:rPr lang="pt-BR" smtClean="0"/>
-              <a:t>04/01/2026</a:t>
+              <a:t>08/01/2026</a:t>
             </a:fld>
             <a:endParaRPr lang="pt-BR"/>
           </a:p>
@@ -7365,7 +7366,7 @@
           <a:p>
             <a:fld id="{0FFCB9F6-63FC-4ED5-A42C-D418A1CF0414}" type="datetimeFigureOut">
               <a:rPr lang="pt-BR" smtClean="0"/>
-              <a:t>04/01/2026</a:t>
+              <a:t>08/01/2026</a:t>
             </a:fld>
             <a:endParaRPr lang="pt-BR"/>
           </a:p>
@@ -7576,7 +7577,7 @@
           <a:p>
             <a:fld id="{0FFCB9F6-63FC-4ED5-A42C-D418A1CF0414}" type="datetimeFigureOut">
               <a:rPr lang="pt-BR" smtClean="0"/>
-              <a:t>04/01/2026</a:t>
+              <a:t>08/01/2026</a:t>
             </a:fld>
             <a:endParaRPr lang="pt-BR"/>
           </a:p>
@@ -8610,7 +8611,7 @@
           <a:p>
             <a:fld id="{0FFCB9F6-63FC-4ED5-A42C-D418A1CF0414}" type="datetimeFigureOut">
               <a:rPr lang="pt-BR" smtClean="0"/>
-              <a:t>04/01/2026</a:t>
+              <a:t>08/01/2026</a:t>
             </a:fld>
             <a:endParaRPr lang="pt-BR"/>
           </a:p>
@@ -8882,7 +8883,7 @@
           <a:p>
             <a:fld id="{0FFCB9F6-63FC-4ED5-A42C-D418A1CF0414}" type="datetimeFigureOut">
               <a:rPr lang="pt-BR" smtClean="0"/>
-              <a:t>04/01/2026</a:t>
+              <a:t>08/01/2026</a:t>
             </a:fld>
             <a:endParaRPr lang="pt-BR"/>
           </a:p>
@@ -9292,7 +9293,7 @@
           <a:p>
             <a:fld id="{0FFCB9F6-63FC-4ED5-A42C-D418A1CF0414}" type="datetimeFigureOut">
               <a:rPr lang="pt-BR" smtClean="0"/>
-              <a:t>04/01/2026</a:t>
+              <a:t>08/01/2026</a:t>
             </a:fld>
             <a:endParaRPr lang="pt-BR"/>
           </a:p>
@@ -9419,7 +9420,7 @@
           <a:p>
             <a:fld id="{0FFCB9F6-63FC-4ED5-A42C-D418A1CF0414}" type="datetimeFigureOut">
               <a:rPr lang="pt-BR" smtClean="0"/>
-              <a:t>04/01/2026</a:t>
+              <a:t>08/01/2026</a:t>
             </a:fld>
             <a:endParaRPr lang="pt-BR"/>
           </a:p>
@@ -9514,7 +9515,7 @@
           <a:p>
             <a:fld id="{0FFCB9F6-63FC-4ED5-A42C-D418A1CF0414}" type="datetimeFigureOut">
               <a:rPr lang="pt-BR" smtClean="0"/>
-              <a:t>04/01/2026</a:t>
+              <a:t>08/01/2026</a:t>
             </a:fld>
             <a:endParaRPr lang="pt-BR"/>
           </a:p>
@@ -10595,7 +10596,7 @@
           <a:p>
             <a:fld id="{0FFCB9F6-63FC-4ED5-A42C-D418A1CF0414}" type="datetimeFigureOut">
               <a:rPr lang="pt-BR" smtClean="0"/>
-              <a:t>04/01/2026</a:t>
+              <a:t>08/01/2026</a:t>
             </a:fld>
             <a:endParaRPr lang="pt-BR"/>
           </a:p>
@@ -11703,7 +11704,7 @@
           <a:p>
             <a:fld id="{0FFCB9F6-63FC-4ED5-A42C-D418A1CF0414}" type="datetimeFigureOut">
               <a:rPr lang="pt-BR" smtClean="0"/>
-              <a:t>04/01/2026</a:t>
+              <a:t>08/01/2026</a:t>
             </a:fld>
             <a:endParaRPr lang="pt-BR"/>
           </a:p>
@@ -12700,7 +12701,7 @@
           <a:p>
             <a:fld id="{0FFCB9F6-63FC-4ED5-A42C-D418A1CF0414}" type="datetimeFigureOut">
               <a:rPr lang="pt-BR" smtClean="0"/>
-              <a:t>04/01/2026</a:t>
+              <a:t>08/01/2026</a:t>
             </a:fld>
             <a:endParaRPr lang="pt-BR"/>
           </a:p>
@@ -13335,8 +13336,8 @@
           <a:lstStyle/>
           <a:p>
             <a:r>
-              <a:rPr lang="pt-BR" dirty="0"/>
-              <a:t>Título teste gemini</a:t>
+              <a:rPr lang="pt-BR" sz="2400" dirty="0"/>
+              <a:t>{{slide1_title}}</a:t>
             </a:r>
           </a:p>
         </p:txBody>
@@ -13365,13 +13366,13 @@
         </p:spPr>
         <p:txBody>
           <a:bodyPr>
-            <a:normAutofit fontScale="92500" lnSpcReduction="20000"/>
+            <a:normAutofit/>
           </a:bodyPr>
           <a:lstStyle/>
           <a:p>
             <a:r>
-              <a:rPr lang="pt-BR" dirty="0"/>
-              <a:t>Sub descrição</a:t>
+              <a:rPr lang="pt-BR" sz="1050" dirty="0"/>
+              <a:t>{{slide1_subtitle}}</a:t>
             </a:r>
           </a:p>
         </p:txBody>
@@ -13471,10 +13472,922 @@
           </a:prstGeom>
         </p:spPr>
       </p:pic>
+      <p:sp>
+        <p:nvSpPr>
+          <p:cNvPr id="5" name="CaixaDeTexto 4">
+            <a:extLst>
+              <a:ext uri="{FF2B5EF4-FFF2-40B4-BE49-F238E27FC236}">
+                <a16:creationId xmlns:a16="http://schemas.microsoft.com/office/drawing/2014/main" id="{2CBEAE15-BDF4-4DE2-E8FA-522FC2F4ED8B}"/>
+              </a:ext>
+            </a:extLst>
+          </p:cNvPr>
+          <p:cNvSpPr txBox="1"/>
+          <p:nvPr/>
+        </p:nvSpPr>
+        <p:spPr>
+          <a:xfrm>
+            <a:off x="758387" y="2086078"/>
+            <a:ext cx="3617447" cy="369332"/>
+          </a:xfrm>
+          <a:prstGeom prst="rect">
+            <a:avLst/>
+          </a:prstGeom>
+          <a:noFill/>
+        </p:spPr>
+        <p:txBody>
+          <a:bodyPr wrap="square" rtlCol="0">
+            <a:spAutoFit/>
+          </a:bodyPr>
+          <a:lstStyle/>
+          <a:p>
+            <a:r>
+              <a:rPr lang="en-US" dirty="0"/>
+              <a:t>{{ROE_RECORRENTE}}%</a:t>
+            </a:r>
+            <a:endParaRPr lang="pt-BR" dirty="0"/>
+          </a:p>
+        </p:txBody>
+      </p:sp>
+      <p:sp>
+        <p:nvSpPr>
+          <p:cNvPr id="6" name="CaixaDeTexto 5">
+            <a:extLst>
+              <a:ext uri="{FF2B5EF4-FFF2-40B4-BE49-F238E27FC236}">
+                <a16:creationId xmlns:a16="http://schemas.microsoft.com/office/drawing/2014/main" id="{D591DB44-461A-77AF-DCC8-68DA7088D40A}"/>
+              </a:ext>
+            </a:extLst>
+          </p:cNvPr>
+          <p:cNvSpPr txBox="1"/>
+          <p:nvPr/>
+        </p:nvSpPr>
+        <p:spPr>
+          <a:xfrm>
+            <a:off x="684208" y="2455410"/>
+            <a:ext cx="3617446" cy="369332"/>
+          </a:xfrm>
+          <a:prstGeom prst="rect">
+            <a:avLst/>
+          </a:prstGeom>
+          <a:noFill/>
+        </p:spPr>
+        <p:txBody>
+          <a:bodyPr wrap="square" rtlCol="0">
+            <a:spAutoFit/>
+          </a:bodyPr>
+          <a:lstStyle/>
+          <a:p>
+            <a:r>
+              <a:rPr lang="en-US" dirty="0"/>
+              <a:t>R$ {{LL_RECORRENTE}} </a:t>
+            </a:r>
+            <a:r>
+              <a:rPr lang="en-US" dirty="0" err="1"/>
+              <a:t>milhòes</a:t>
+            </a:r>
+            <a:endParaRPr lang="pt-BR" dirty="0"/>
+          </a:p>
+        </p:txBody>
+      </p:sp>
+      <p:sp>
+        <p:nvSpPr>
+          <p:cNvPr id="11" name="CaixaDeTexto 10">
+            <a:extLst>
+              <a:ext uri="{FF2B5EF4-FFF2-40B4-BE49-F238E27FC236}">
+                <a16:creationId xmlns:a16="http://schemas.microsoft.com/office/drawing/2014/main" id="{5089DB41-D279-481E-77B4-AA5B67B69D1F}"/>
+              </a:ext>
+            </a:extLst>
+          </p:cNvPr>
+          <p:cNvSpPr txBox="1"/>
+          <p:nvPr/>
+        </p:nvSpPr>
+        <p:spPr>
+          <a:xfrm>
+            <a:off x="564454" y="6342483"/>
+            <a:ext cx="754549" cy="230832"/>
+          </a:xfrm>
+          <a:prstGeom prst="rect">
+            <a:avLst/>
+          </a:prstGeom>
+          <a:solidFill>
+            <a:schemeClr val="bg2">
+              <a:lumMod val="25000"/>
+            </a:schemeClr>
+          </a:solidFill>
+          <a:ln>
+            <a:solidFill>
+              <a:schemeClr val="bg2"/>
+            </a:solidFill>
+          </a:ln>
+        </p:spPr>
+        <p:style>
+          <a:lnRef idx="2">
+            <a:schemeClr val="accent2"/>
+          </a:lnRef>
+          <a:fillRef idx="1">
+            <a:schemeClr val="lt1"/>
+          </a:fillRef>
+          <a:effectRef idx="0">
+            <a:schemeClr val="accent2"/>
+          </a:effectRef>
+          <a:fontRef idx="minor">
+            <a:schemeClr val="dk1"/>
+          </a:fontRef>
+        </p:style>
+        <p:txBody>
+          <a:bodyPr wrap="square" rtlCol="0">
+            <a:spAutoFit/>
+          </a:bodyPr>
+          <a:lstStyle/>
+          <a:p>
+            <a:pPr algn="ctr"/>
+            <a:r>
+              <a:rPr lang="en-US" sz="900" dirty="0">
+                <a:solidFill>
+                  <a:schemeClr val="bg1"/>
+                </a:solidFill>
+              </a:rPr>
+              <a:t>{{NIM1}}%</a:t>
+            </a:r>
+            <a:endParaRPr lang="pt-BR" sz="900" dirty="0">
+              <a:solidFill>
+                <a:schemeClr val="bg1"/>
+              </a:solidFill>
+            </a:endParaRPr>
+          </a:p>
+        </p:txBody>
+      </p:sp>
+      <p:sp>
+        <p:nvSpPr>
+          <p:cNvPr id="12" name="CaixaDeTexto 11">
+            <a:extLst>
+              <a:ext uri="{FF2B5EF4-FFF2-40B4-BE49-F238E27FC236}">
+                <a16:creationId xmlns:a16="http://schemas.microsoft.com/office/drawing/2014/main" id="{454F71C8-7A24-B403-FB84-AD75858C2C76}"/>
+              </a:ext>
+            </a:extLst>
+          </p:cNvPr>
+          <p:cNvSpPr txBox="1"/>
+          <p:nvPr/>
+        </p:nvSpPr>
+        <p:spPr>
+          <a:xfrm>
+            <a:off x="1461790" y="6344906"/>
+            <a:ext cx="754549" cy="230832"/>
+          </a:xfrm>
+          <a:prstGeom prst="rect">
+            <a:avLst/>
+          </a:prstGeom>
+          <a:solidFill>
+            <a:schemeClr val="bg2">
+              <a:lumMod val="25000"/>
+            </a:schemeClr>
+          </a:solidFill>
+          <a:ln>
+            <a:solidFill>
+              <a:schemeClr val="bg2"/>
+            </a:solidFill>
+          </a:ln>
+        </p:spPr>
+        <p:style>
+          <a:lnRef idx="2">
+            <a:schemeClr val="accent2"/>
+          </a:lnRef>
+          <a:fillRef idx="1">
+            <a:schemeClr val="lt1"/>
+          </a:fillRef>
+          <a:effectRef idx="0">
+            <a:schemeClr val="accent2"/>
+          </a:effectRef>
+          <a:fontRef idx="minor">
+            <a:schemeClr val="dk1"/>
+          </a:fontRef>
+        </p:style>
+        <p:txBody>
+          <a:bodyPr wrap="square" rtlCol="0">
+            <a:spAutoFit/>
+          </a:bodyPr>
+          <a:lstStyle/>
+          <a:p>
+            <a:pPr algn="ctr"/>
+            <a:r>
+              <a:rPr lang="en-US" sz="900" dirty="0">
+                <a:solidFill>
+                  <a:schemeClr val="bg1"/>
+                </a:solidFill>
+              </a:rPr>
+              <a:t>{{NIM2}}%</a:t>
+            </a:r>
+            <a:endParaRPr lang="pt-BR" sz="900" dirty="0">
+              <a:solidFill>
+                <a:schemeClr val="bg1"/>
+              </a:solidFill>
+            </a:endParaRPr>
+          </a:p>
+        </p:txBody>
+      </p:sp>
+      <p:sp>
+        <p:nvSpPr>
+          <p:cNvPr id="13" name="CaixaDeTexto 12">
+            <a:extLst>
+              <a:ext uri="{FF2B5EF4-FFF2-40B4-BE49-F238E27FC236}">
+                <a16:creationId xmlns:a16="http://schemas.microsoft.com/office/drawing/2014/main" id="{6D30139C-AA48-5336-4706-C9F6121C68C2}"/>
+              </a:ext>
+            </a:extLst>
+          </p:cNvPr>
+          <p:cNvSpPr txBox="1"/>
+          <p:nvPr/>
+        </p:nvSpPr>
+        <p:spPr>
+          <a:xfrm>
+            <a:off x="2359126" y="6348774"/>
+            <a:ext cx="754549" cy="230832"/>
+          </a:xfrm>
+          <a:prstGeom prst="rect">
+            <a:avLst/>
+          </a:prstGeom>
+          <a:solidFill>
+            <a:schemeClr val="bg2">
+              <a:lumMod val="25000"/>
+            </a:schemeClr>
+          </a:solidFill>
+          <a:ln>
+            <a:solidFill>
+              <a:schemeClr val="bg2"/>
+            </a:solidFill>
+          </a:ln>
+        </p:spPr>
+        <p:style>
+          <a:lnRef idx="2">
+            <a:schemeClr val="accent2"/>
+          </a:lnRef>
+          <a:fillRef idx="1">
+            <a:schemeClr val="lt1"/>
+          </a:fillRef>
+          <a:effectRef idx="0">
+            <a:schemeClr val="accent2"/>
+          </a:effectRef>
+          <a:fontRef idx="minor">
+            <a:schemeClr val="dk1"/>
+          </a:fontRef>
+        </p:style>
+        <p:txBody>
+          <a:bodyPr wrap="square" rtlCol="0">
+            <a:spAutoFit/>
+          </a:bodyPr>
+          <a:lstStyle/>
+          <a:p>
+            <a:pPr algn="ctr"/>
+            <a:r>
+              <a:rPr lang="en-US" sz="900" dirty="0">
+                <a:solidFill>
+                  <a:schemeClr val="bg1"/>
+                </a:solidFill>
+              </a:rPr>
+              <a:t>{{NIM3}}%</a:t>
+            </a:r>
+            <a:endParaRPr lang="pt-BR" sz="900" dirty="0">
+              <a:solidFill>
+                <a:schemeClr val="bg1"/>
+              </a:solidFill>
+            </a:endParaRPr>
+          </a:p>
+        </p:txBody>
+      </p:sp>
+      <p:sp>
+        <p:nvSpPr>
+          <p:cNvPr id="14" name="CaixaDeTexto 13">
+            <a:extLst>
+              <a:ext uri="{FF2B5EF4-FFF2-40B4-BE49-F238E27FC236}">
+                <a16:creationId xmlns:a16="http://schemas.microsoft.com/office/drawing/2014/main" id="{8DB0AE12-7145-719D-F3D5-67E522C8798B}"/>
+              </a:ext>
+            </a:extLst>
+          </p:cNvPr>
+          <p:cNvSpPr txBox="1"/>
+          <p:nvPr/>
+        </p:nvSpPr>
+        <p:spPr>
+          <a:xfrm>
+            <a:off x="3256462" y="6351197"/>
+            <a:ext cx="754549" cy="230832"/>
+          </a:xfrm>
+          <a:prstGeom prst="rect">
+            <a:avLst/>
+          </a:prstGeom>
+          <a:solidFill>
+            <a:schemeClr val="bg2">
+              <a:lumMod val="25000"/>
+            </a:schemeClr>
+          </a:solidFill>
+          <a:ln>
+            <a:solidFill>
+              <a:schemeClr val="bg2"/>
+            </a:solidFill>
+          </a:ln>
+        </p:spPr>
+        <p:style>
+          <a:lnRef idx="2">
+            <a:schemeClr val="accent2"/>
+          </a:lnRef>
+          <a:fillRef idx="1">
+            <a:schemeClr val="lt1"/>
+          </a:fillRef>
+          <a:effectRef idx="0">
+            <a:schemeClr val="accent2"/>
+          </a:effectRef>
+          <a:fontRef idx="minor">
+            <a:schemeClr val="dk1"/>
+          </a:fontRef>
+        </p:style>
+        <p:txBody>
+          <a:bodyPr wrap="square" rtlCol="0">
+            <a:spAutoFit/>
+          </a:bodyPr>
+          <a:lstStyle/>
+          <a:p>
+            <a:pPr algn="ctr"/>
+            <a:r>
+              <a:rPr lang="en-US" sz="900" dirty="0">
+                <a:solidFill>
+                  <a:schemeClr val="bg1"/>
+                </a:solidFill>
+              </a:rPr>
+              <a:t>{{NIM4}}%</a:t>
+            </a:r>
+            <a:endParaRPr lang="pt-BR" sz="900" dirty="0">
+              <a:solidFill>
+                <a:schemeClr val="bg1"/>
+              </a:solidFill>
+            </a:endParaRPr>
+          </a:p>
+        </p:txBody>
+      </p:sp>
+      <p:sp>
+        <p:nvSpPr>
+          <p:cNvPr id="15" name="CaixaDeTexto 14">
+            <a:extLst>
+              <a:ext uri="{FF2B5EF4-FFF2-40B4-BE49-F238E27FC236}">
+                <a16:creationId xmlns:a16="http://schemas.microsoft.com/office/drawing/2014/main" id="{43427753-0B5A-1FAC-F009-3D9AC9BA34FC}"/>
+              </a:ext>
+            </a:extLst>
+          </p:cNvPr>
+          <p:cNvSpPr txBox="1"/>
+          <p:nvPr/>
+        </p:nvSpPr>
+        <p:spPr>
+          <a:xfrm>
+            <a:off x="4148495" y="6342483"/>
+            <a:ext cx="754549" cy="230832"/>
+          </a:xfrm>
+          <a:prstGeom prst="rect">
+            <a:avLst/>
+          </a:prstGeom>
+          <a:solidFill>
+            <a:schemeClr val="bg2">
+              <a:lumMod val="25000"/>
+            </a:schemeClr>
+          </a:solidFill>
+          <a:ln>
+            <a:solidFill>
+              <a:schemeClr val="bg2"/>
+            </a:solidFill>
+          </a:ln>
+        </p:spPr>
+        <p:style>
+          <a:lnRef idx="2">
+            <a:schemeClr val="accent2"/>
+          </a:lnRef>
+          <a:fillRef idx="1">
+            <a:schemeClr val="lt1"/>
+          </a:fillRef>
+          <a:effectRef idx="0">
+            <a:schemeClr val="accent2"/>
+          </a:effectRef>
+          <a:fontRef idx="minor">
+            <a:schemeClr val="dk1"/>
+          </a:fontRef>
+        </p:style>
+        <p:txBody>
+          <a:bodyPr wrap="square" rtlCol="0">
+            <a:spAutoFit/>
+          </a:bodyPr>
+          <a:lstStyle/>
+          <a:p>
+            <a:pPr algn="ctr"/>
+            <a:r>
+              <a:rPr lang="en-US" sz="900" dirty="0">
+                <a:solidFill>
+                  <a:schemeClr val="bg1"/>
+                </a:solidFill>
+              </a:rPr>
+              <a:t>{{NIM5}}%</a:t>
+            </a:r>
+            <a:endParaRPr lang="pt-BR" sz="900" dirty="0">
+              <a:solidFill>
+                <a:schemeClr val="bg1"/>
+              </a:solidFill>
+            </a:endParaRPr>
+          </a:p>
+        </p:txBody>
+      </p:sp>
+      <p:sp>
+        <p:nvSpPr>
+          <p:cNvPr id="16" name="CaixaDeTexto 15">
+            <a:extLst>
+              <a:ext uri="{FF2B5EF4-FFF2-40B4-BE49-F238E27FC236}">
+                <a16:creationId xmlns:a16="http://schemas.microsoft.com/office/drawing/2014/main" id="{F5F1595C-1363-2182-3FCC-E5A73EC55F9F}"/>
+              </a:ext>
+            </a:extLst>
+          </p:cNvPr>
+          <p:cNvSpPr txBox="1"/>
+          <p:nvPr/>
+        </p:nvSpPr>
+        <p:spPr>
+          <a:xfrm>
+            <a:off x="5045831" y="6344906"/>
+            <a:ext cx="754549" cy="230832"/>
+          </a:xfrm>
+          <a:prstGeom prst="rect">
+            <a:avLst/>
+          </a:prstGeom>
+          <a:solidFill>
+            <a:schemeClr val="bg2">
+              <a:lumMod val="25000"/>
+            </a:schemeClr>
+          </a:solidFill>
+          <a:ln>
+            <a:solidFill>
+              <a:schemeClr val="bg2"/>
+            </a:solidFill>
+          </a:ln>
+        </p:spPr>
+        <p:style>
+          <a:lnRef idx="2">
+            <a:schemeClr val="accent2"/>
+          </a:lnRef>
+          <a:fillRef idx="1">
+            <a:schemeClr val="lt1"/>
+          </a:fillRef>
+          <a:effectRef idx="0">
+            <a:schemeClr val="accent2"/>
+          </a:effectRef>
+          <a:fontRef idx="minor">
+            <a:schemeClr val="dk1"/>
+          </a:fontRef>
+        </p:style>
+        <p:txBody>
+          <a:bodyPr wrap="square" rtlCol="0">
+            <a:spAutoFit/>
+          </a:bodyPr>
+          <a:lstStyle/>
+          <a:p>
+            <a:pPr algn="ctr"/>
+            <a:r>
+              <a:rPr lang="en-US" sz="900" dirty="0">
+                <a:solidFill>
+                  <a:schemeClr val="bg1"/>
+                </a:solidFill>
+              </a:rPr>
+              <a:t>{{NIM6}}%</a:t>
+            </a:r>
+            <a:endParaRPr lang="pt-BR" sz="900" dirty="0">
+              <a:solidFill>
+                <a:schemeClr val="bg1"/>
+              </a:solidFill>
+            </a:endParaRPr>
+          </a:p>
+        </p:txBody>
+      </p:sp>
+      <p:sp>
+        <p:nvSpPr>
+          <p:cNvPr id="17" name="CaixaDeTexto 16">
+            <a:extLst>
+              <a:ext uri="{FF2B5EF4-FFF2-40B4-BE49-F238E27FC236}">
+                <a16:creationId xmlns:a16="http://schemas.microsoft.com/office/drawing/2014/main" id="{3258AE2A-DB2A-201A-24FB-5333DC3779BC}"/>
+              </a:ext>
+            </a:extLst>
+          </p:cNvPr>
+          <p:cNvSpPr txBox="1"/>
+          <p:nvPr/>
+        </p:nvSpPr>
+        <p:spPr>
+          <a:xfrm>
+            <a:off x="5943167" y="6348774"/>
+            <a:ext cx="754549" cy="230832"/>
+          </a:xfrm>
+          <a:prstGeom prst="rect">
+            <a:avLst/>
+          </a:prstGeom>
+          <a:solidFill>
+            <a:schemeClr val="bg2">
+              <a:lumMod val="25000"/>
+            </a:schemeClr>
+          </a:solidFill>
+          <a:ln>
+            <a:solidFill>
+              <a:schemeClr val="bg2"/>
+            </a:solidFill>
+          </a:ln>
+        </p:spPr>
+        <p:style>
+          <a:lnRef idx="2">
+            <a:schemeClr val="accent2"/>
+          </a:lnRef>
+          <a:fillRef idx="1">
+            <a:schemeClr val="lt1"/>
+          </a:fillRef>
+          <a:effectRef idx="0">
+            <a:schemeClr val="accent2"/>
+          </a:effectRef>
+          <a:fontRef idx="minor">
+            <a:schemeClr val="dk1"/>
+          </a:fontRef>
+        </p:style>
+        <p:txBody>
+          <a:bodyPr wrap="square" rtlCol="0">
+            <a:spAutoFit/>
+          </a:bodyPr>
+          <a:lstStyle/>
+          <a:p>
+            <a:pPr algn="ctr"/>
+            <a:r>
+              <a:rPr lang="en-US" sz="900" dirty="0">
+                <a:solidFill>
+                  <a:schemeClr val="bg1"/>
+                </a:solidFill>
+              </a:rPr>
+              <a:t>{{NIM7}}%</a:t>
+            </a:r>
+            <a:endParaRPr lang="pt-BR" sz="900" dirty="0">
+              <a:solidFill>
+                <a:schemeClr val="bg1"/>
+              </a:solidFill>
+            </a:endParaRPr>
+          </a:p>
+        </p:txBody>
+      </p:sp>
+      <p:sp>
+        <p:nvSpPr>
+          <p:cNvPr id="18" name="CaixaDeTexto 17">
+            <a:extLst>
+              <a:ext uri="{FF2B5EF4-FFF2-40B4-BE49-F238E27FC236}">
+                <a16:creationId xmlns:a16="http://schemas.microsoft.com/office/drawing/2014/main" id="{23A3CE42-85EA-1650-B881-D76B11C50CC3}"/>
+              </a:ext>
+            </a:extLst>
+          </p:cNvPr>
+          <p:cNvSpPr txBox="1"/>
+          <p:nvPr/>
+        </p:nvSpPr>
+        <p:spPr>
+          <a:xfrm>
+            <a:off x="6840503" y="6351197"/>
+            <a:ext cx="754549" cy="230832"/>
+          </a:xfrm>
+          <a:prstGeom prst="rect">
+            <a:avLst/>
+          </a:prstGeom>
+          <a:solidFill>
+            <a:schemeClr val="bg2">
+              <a:lumMod val="25000"/>
+            </a:schemeClr>
+          </a:solidFill>
+          <a:ln>
+            <a:solidFill>
+              <a:schemeClr val="bg2"/>
+            </a:solidFill>
+          </a:ln>
+        </p:spPr>
+        <p:style>
+          <a:lnRef idx="2">
+            <a:schemeClr val="accent2"/>
+          </a:lnRef>
+          <a:fillRef idx="1">
+            <a:schemeClr val="lt1"/>
+          </a:fillRef>
+          <a:effectRef idx="0">
+            <a:schemeClr val="accent2"/>
+          </a:effectRef>
+          <a:fontRef idx="minor">
+            <a:schemeClr val="dk1"/>
+          </a:fontRef>
+        </p:style>
+        <p:txBody>
+          <a:bodyPr wrap="square" rtlCol="0">
+            <a:spAutoFit/>
+          </a:bodyPr>
+          <a:lstStyle/>
+          <a:p>
+            <a:pPr algn="ctr"/>
+            <a:r>
+              <a:rPr lang="en-US" sz="900" dirty="0">
+                <a:solidFill>
+                  <a:schemeClr val="bg1"/>
+                </a:solidFill>
+              </a:rPr>
+              <a:t>{{NIM8}}%</a:t>
+            </a:r>
+            <a:endParaRPr lang="pt-BR" sz="900" dirty="0">
+              <a:solidFill>
+                <a:schemeClr val="bg1"/>
+              </a:solidFill>
+            </a:endParaRPr>
+          </a:p>
+        </p:txBody>
+      </p:sp>
+      <p:sp>
+        <p:nvSpPr>
+          <p:cNvPr id="19" name="CaixaDeTexto 18">
+            <a:extLst>
+              <a:ext uri="{FF2B5EF4-FFF2-40B4-BE49-F238E27FC236}">
+                <a16:creationId xmlns:a16="http://schemas.microsoft.com/office/drawing/2014/main" id="{24B0944F-2113-9740-5954-30EE345CEFC7}"/>
+              </a:ext>
+            </a:extLst>
+          </p:cNvPr>
+          <p:cNvSpPr txBox="1"/>
+          <p:nvPr/>
+        </p:nvSpPr>
+        <p:spPr>
+          <a:xfrm>
+            <a:off x="7732211" y="6348774"/>
+            <a:ext cx="754549" cy="230832"/>
+          </a:xfrm>
+          <a:prstGeom prst="rect">
+            <a:avLst/>
+          </a:prstGeom>
+          <a:solidFill>
+            <a:schemeClr val="bg2">
+              <a:lumMod val="25000"/>
+            </a:schemeClr>
+          </a:solidFill>
+          <a:ln>
+            <a:solidFill>
+              <a:schemeClr val="bg2"/>
+            </a:solidFill>
+          </a:ln>
+        </p:spPr>
+        <p:style>
+          <a:lnRef idx="2">
+            <a:schemeClr val="accent2"/>
+          </a:lnRef>
+          <a:fillRef idx="1">
+            <a:schemeClr val="lt1"/>
+          </a:fillRef>
+          <a:effectRef idx="0">
+            <a:schemeClr val="accent2"/>
+          </a:effectRef>
+          <a:fontRef idx="minor">
+            <a:schemeClr val="dk1"/>
+          </a:fontRef>
+        </p:style>
+        <p:txBody>
+          <a:bodyPr wrap="square" rtlCol="0">
+            <a:spAutoFit/>
+          </a:bodyPr>
+          <a:lstStyle/>
+          <a:p>
+            <a:pPr algn="ctr"/>
+            <a:r>
+              <a:rPr lang="en-US" sz="900" dirty="0">
+                <a:solidFill>
+                  <a:schemeClr val="bg1"/>
+                </a:solidFill>
+              </a:rPr>
+              <a:t>{{NIM9}}%</a:t>
+            </a:r>
+            <a:endParaRPr lang="pt-BR" sz="900" dirty="0">
+              <a:solidFill>
+                <a:schemeClr val="bg1"/>
+              </a:solidFill>
+            </a:endParaRPr>
+          </a:p>
+        </p:txBody>
+      </p:sp>
+      <p:sp>
+        <p:nvSpPr>
+          <p:cNvPr id="20" name="CaixaDeTexto 19">
+            <a:extLst>
+              <a:ext uri="{FF2B5EF4-FFF2-40B4-BE49-F238E27FC236}">
+                <a16:creationId xmlns:a16="http://schemas.microsoft.com/office/drawing/2014/main" id="{D503C839-0EEB-BF53-0EA0-FF09647D77F9}"/>
+              </a:ext>
+            </a:extLst>
+          </p:cNvPr>
+          <p:cNvSpPr txBox="1"/>
+          <p:nvPr/>
+        </p:nvSpPr>
+        <p:spPr>
+          <a:xfrm>
+            <a:off x="8729151" y="6256040"/>
+            <a:ext cx="803360" cy="230832"/>
+          </a:xfrm>
+          <a:prstGeom prst="rect">
+            <a:avLst/>
+          </a:prstGeom>
+          <a:solidFill>
+            <a:schemeClr val="bg2">
+              <a:lumMod val="25000"/>
+            </a:schemeClr>
+          </a:solidFill>
+          <a:ln>
+            <a:solidFill>
+              <a:schemeClr val="bg2"/>
+            </a:solidFill>
+          </a:ln>
+        </p:spPr>
+        <p:style>
+          <a:lnRef idx="2">
+            <a:schemeClr val="accent2"/>
+          </a:lnRef>
+          <a:fillRef idx="1">
+            <a:schemeClr val="lt1"/>
+          </a:fillRef>
+          <a:effectRef idx="0">
+            <a:schemeClr val="accent2"/>
+          </a:effectRef>
+          <a:fontRef idx="minor">
+            <a:schemeClr val="dk1"/>
+          </a:fontRef>
+        </p:style>
+        <p:txBody>
+          <a:bodyPr wrap="square" rtlCol="0">
+            <a:spAutoFit/>
+          </a:bodyPr>
+          <a:lstStyle/>
+          <a:p>
+            <a:pPr algn="ctr"/>
+            <a:r>
+              <a:rPr lang="en-US" sz="900" dirty="0">
+                <a:solidFill>
+                  <a:schemeClr val="bg1"/>
+                </a:solidFill>
+              </a:rPr>
+              <a:t>{{NIM10}}%</a:t>
+            </a:r>
+            <a:endParaRPr lang="pt-BR" sz="900" dirty="0">
+              <a:solidFill>
+                <a:schemeClr val="bg1"/>
+              </a:solidFill>
+            </a:endParaRPr>
+          </a:p>
+        </p:txBody>
+      </p:sp>
+      <p:sp>
+        <p:nvSpPr>
+          <p:cNvPr id="21" name="CaixaDeTexto 20">
+            <a:extLst>
+              <a:ext uri="{FF2B5EF4-FFF2-40B4-BE49-F238E27FC236}">
+                <a16:creationId xmlns:a16="http://schemas.microsoft.com/office/drawing/2014/main" id="{7987135C-33D5-3475-D682-619B8EF90780}"/>
+              </a:ext>
+            </a:extLst>
+          </p:cNvPr>
+          <p:cNvSpPr txBox="1"/>
+          <p:nvPr/>
+        </p:nvSpPr>
+        <p:spPr>
+          <a:xfrm>
+            <a:off x="10240524" y="6253495"/>
+            <a:ext cx="803360" cy="230832"/>
+          </a:xfrm>
+          <a:prstGeom prst="rect">
+            <a:avLst/>
+          </a:prstGeom>
+          <a:solidFill>
+            <a:schemeClr val="bg2">
+              <a:lumMod val="25000"/>
+            </a:schemeClr>
+          </a:solidFill>
+          <a:ln>
+            <a:solidFill>
+              <a:schemeClr val="bg2"/>
+            </a:solidFill>
+          </a:ln>
+        </p:spPr>
+        <p:style>
+          <a:lnRef idx="2">
+            <a:schemeClr val="accent2"/>
+          </a:lnRef>
+          <a:fillRef idx="1">
+            <a:schemeClr val="lt1"/>
+          </a:fillRef>
+          <a:effectRef idx="0">
+            <a:schemeClr val="accent2"/>
+          </a:effectRef>
+          <a:fontRef idx="minor">
+            <a:schemeClr val="dk1"/>
+          </a:fontRef>
+        </p:style>
+        <p:txBody>
+          <a:bodyPr wrap="square" rtlCol="0">
+            <a:spAutoFit/>
+          </a:bodyPr>
+          <a:lstStyle/>
+          <a:p>
+            <a:pPr algn="ctr"/>
+            <a:r>
+              <a:rPr lang="en-US" sz="900" dirty="0">
+                <a:solidFill>
+                  <a:schemeClr val="bg1"/>
+                </a:solidFill>
+              </a:rPr>
+              <a:t>{{NIM11}}%</a:t>
+            </a:r>
+            <a:endParaRPr lang="pt-BR" sz="900" dirty="0">
+              <a:solidFill>
+                <a:schemeClr val="bg1"/>
+              </a:solidFill>
+            </a:endParaRPr>
+          </a:p>
+        </p:txBody>
+      </p:sp>
     </p:spTree>
     <p:extLst>
       <p:ext uri="{BB962C8B-B14F-4D97-AF65-F5344CB8AC3E}">
         <p14:creationId xmlns:p14="http://schemas.microsoft.com/office/powerpoint/2010/main" val="879313254"/>
+      </p:ext>
+    </p:extLst>
+  </p:cSld>
+  <p:clrMapOvr>
+    <a:masterClrMapping/>
+  </p:clrMapOvr>
+</p:sld>
+</file>
+
+<file path=ppt/slides/slide2.xml><?xml version="1.0" encoding="utf-8"?>
+<p:sld xmlns:a="http://schemas.openxmlformats.org/drawingml/2006/main" xmlns:r="http://schemas.openxmlformats.org/officeDocument/2006/relationships" xmlns:p="http://schemas.openxmlformats.org/presentationml/2006/main">
+  <p:cSld>
+    <p:spTree>
+      <p:nvGrpSpPr>
+        <p:cNvPr id="1" name=""/>
+        <p:cNvGrpSpPr/>
+        <p:nvPr/>
+      </p:nvGrpSpPr>
+      <p:grpSpPr>
+        <a:xfrm>
+          <a:off x="0" y="0"/>
+          <a:ext cx="0" cy="0"/>
+          <a:chOff x="0" y="0"/>
+          <a:chExt cx="0" cy="0"/>
+        </a:xfrm>
+      </p:grpSpPr>
+      <p:sp>
+        <p:nvSpPr>
+          <p:cNvPr id="2" name="Título 1">
+            <a:extLst>
+              <a:ext uri="{FF2B5EF4-FFF2-40B4-BE49-F238E27FC236}">
+                <a16:creationId xmlns:a16="http://schemas.microsoft.com/office/drawing/2014/main" id="{375CEC55-5620-0728-8DD1-2BEC363F608F}"/>
+              </a:ext>
+            </a:extLst>
+          </p:cNvPr>
+          <p:cNvSpPr>
+            <a:spLocks noGrp="1"/>
+          </p:cNvSpPr>
+          <p:nvPr>
+            <p:ph type="title"/>
+          </p:nvPr>
+        </p:nvSpPr>
+        <p:spPr/>
+        <p:txBody>
+          <a:bodyPr/>
+          <a:lstStyle/>
+          <a:p>
+            <a:r>
+              <a:rPr lang="en-US" dirty="0"/>
+              <a:t>{{testing}}</a:t>
+            </a:r>
+            <a:endParaRPr lang="pt-BR" dirty="0"/>
+          </a:p>
+        </p:txBody>
+      </p:sp>
+      <p:sp>
+        <p:nvSpPr>
+          <p:cNvPr id="3" name="Marcador de Posição de Conteúdo 2">
+            <a:extLst>
+              <a:ext uri="{FF2B5EF4-FFF2-40B4-BE49-F238E27FC236}">
+                <a16:creationId xmlns:a16="http://schemas.microsoft.com/office/drawing/2014/main" id="{C57F8E77-A7A9-E30B-4CEE-50AF85F63643}"/>
+              </a:ext>
+            </a:extLst>
+          </p:cNvPr>
+          <p:cNvSpPr>
+            <a:spLocks noGrp="1"/>
+          </p:cNvSpPr>
+          <p:nvPr>
+            <p:ph idx="1"/>
+          </p:nvPr>
+        </p:nvSpPr>
+        <p:spPr/>
+        <p:txBody>
+          <a:bodyPr/>
+          <a:lstStyle/>
+          <a:p>
+            <a:r>
+              <a:rPr lang="en-US" dirty="0"/>
+              <a:t>{{text2}}</a:t>
+            </a:r>
+            <a:endParaRPr lang="pt-BR" dirty="0"/>
+          </a:p>
+        </p:txBody>
+      </p:sp>
+    </p:spTree>
+    <p:extLst>
+      <p:ext uri="{BB962C8B-B14F-4D97-AF65-F5344CB8AC3E}">
+        <p14:creationId xmlns:p14="http://schemas.microsoft.com/office/powerpoint/2010/main" val="3895919542"/>
       </p:ext>
     </p:extLst>
   </p:cSld>

</xml_diff>